<commit_message>
try sarima, error combination, new param
</commit_message>
<xml_diff>
--- a/Progress/Slides/CAPSTONE PROJECT - NAJIBAH - PART 2.pptx
+++ b/Progress/Slides/CAPSTONE PROJECT - NAJIBAH - PART 2.pptx
@@ -235,7 +235,7 @@
           <a:p>
             <a:fld id="{3EFD42F7-718C-4B98-AAEC-167E6DDD60A7}" type="datetimeFigureOut">
               <a:rPr lang="en-US" smtClean="0"/>
-              <a:t>6/2/2024</a:t>
+              <a:t>6/20/2024</a:t>
             </a:fld>
             <a:endParaRPr lang="en-US"/>
           </a:p>
@@ -28960,7 +28960,7 @@
         <p:spPr>
           <a:xfrm>
             <a:off x="9604941" y="3263411"/>
-            <a:ext cx="1940800" cy="1023492"/>
+            <a:ext cx="1940800" cy="1725268"/>
           </a:xfrm>
           <a:prstGeom prst="rect">
             <a:avLst/>
@@ -28976,7 +28976,7 @@
           </a:bodyPr>
           <a:lstStyle/>
           <a:p>
-            <a:pPr algn="ctr" defTabSz="1219170">
+            <a:pPr defTabSz="1219170">
               <a:buClr>
                 <a:srgbClr val="000000"/>
               </a:buClr>
@@ -29012,6 +29012,22 @@
                 <a:srgbClr val="000000"/>
               </a:buClr>
             </a:pPr>
+            <a:endParaRPr lang="en" sz="1600" kern="0" dirty="0">
+              <a:solidFill>
+                <a:srgbClr val="000000"/>
+              </a:solidFill>
+              <a:latin typeface="Roboto"/>
+              <a:ea typeface="Roboto"/>
+              <a:cs typeface="Roboto"/>
+              <a:sym typeface="Roboto"/>
+            </a:endParaRPr>
+          </a:p>
+          <a:p>
+            <a:pPr defTabSz="1219170">
+              <a:buClr>
+                <a:srgbClr val="000000"/>
+              </a:buClr>
+            </a:pPr>
             <a:r>
               <a:rPr lang="en" sz="1600" kern="0" dirty="0">
                 <a:solidFill>
@@ -29022,7 +29038,7 @@
                 <a:cs typeface="Roboto"/>
                 <a:sym typeface="Roboto"/>
               </a:rPr>
-              <a:t>predict the usage of power consumption</a:t>
+              <a:t>Predict the usage of power consumption</a:t>
             </a:r>
             <a:endParaRPr sz="1600" kern="0" dirty="0">
               <a:solidFill>
@@ -31079,10 +31095,10 @@
         </p:nvGrpSpPr>
         <p:grpSpPr>
           <a:xfrm>
-            <a:off x="98214" y="1296072"/>
-            <a:ext cx="11875250" cy="5561928"/>
-            <a:chOff x="98214" y="1064649"/>
-            <a:chExt cx="11875250" cy="5793350"/>
+            <a:off x="139204" y="1296072"/>
+            <a:ext cx="11981123" cy="5561928"/>
+            <a:chOff x="139204" y="1064649"/>
+            <a:chExt cx="11981123" cy="5793350"/>
           </a:xfrm>
         </p:grpSpPr>
         <p:grpSp>
@@ -31685,10 +31701,10 @@
           </p:nvGrpSpPr>
           <p:grpSpPr>
             <a:xfrm>
-              <a:off x="9216050" y="1673268"/>
-              <a:ext cx="2757414" cy="1566244"/>
-              <a:chOff x="6464231" y="860760"/>
-              <a:chExt cx="2106119" cy="1495891"/>
+              <a:off x="9415882" y="1752913"/>
+              <a:ext cx="2704445" cy="1730934"/>
+              <a:chOff x="6616863" y="936827"/>
+              <a:chExt cx="2065661" cy="1653183"/>
             </a:xfrm>
           </p:grpSpPr>
           <p:sp>
@@ -31699,7 +31715,7 @@
             </p:nvSpPr>
             <p:spPr>
               <a:xfrm>
-                <a:off x="6464231" y="860760"/>
+                <a:off x="6616863" y="936827"/>
                 <a:ext cx="2053200" cy="1070969"/>
               </a:xfrm>
               <a:prstGeom prst="rect">
@@ -31984,7 +32000,7 @@
             </p:nvSpPr>
             <p:spPr>
               <a:xfrm>
-                <a:off x="6517150" y="1864051"/>
+                <a:off x="6629324" y="2097410"/>
                 <a:ext cx="2053200" cy="492600"/>
               </a:xfrm>
               <a:prstGeom prst="rect">
@@ -32839,10 +32855,10 @@
           </p:nvGrpSpPr>
           <p:grpSpPr>
             <a:xfrm>
-              <a:off x="98214" y="1626547"/>
-              <a:ext cx="2801678" cy="1704318"/>
-              <a:chOff x="626498" y="728887"/>
-              <a:chExt cx="2139927" cy="1627763"/>
+              <a:off x="139204" y="1920418"/>
+              <a:ext cx="2789640" cy="1653790"/>
+              <a:chOff x="657806" y="1009559"/>
+              <a:chExt cx="2130732" cy="1579505"/>
             </a:xfrm>
           </p:grpSpPr>
           <p:sp>
@@ -32853,7 +32869,7 @@
             </p:nvSpPr>
             <p:spPr>
               <a:xfrm>
-                <a:off x="626498" y="728887"/>
+                <a:off x="735338" y="1009559"/>
                 <a:ext cx="2053200" cy="1135163"/>
               </a:xfrm>
               <a:prstGeom prst="rect">
@@ -33129,7 +33145,7 @@
             </p:nvSpPr>
             <p:spPr>
               <a:xfrm>
-                <a:off x="713225" y="1864050"/>
+                <a:off x="657806" y="2096464"/>
                 <a:ext cx="2053200" cy="492600"/>
               </a:xfrm>
               <a:prstGeom prst="rect">

</xml_diff>